<commit_message>
add pageWrapper in 404 page
</commit_message>
<xml_diff>
--- a/UI/Blog_UI.pptx
+++ b/UI/Blog_UI.pptx
@@ -8,6 +8,8 @@
     <p:sldId id="257" r:id="rId2"/>
     <p:sldId id="256" r:id="rId3"/>
     <p:sldId id="258" r:id="rId4"/>
+    <p:sldId id="259" r:id="rId5"/>
+    <p:sldId id="260" r:id="rId6"/>
   </p:sldIdLst>
   <p:sldSz cx="12192000" cy="6858000"/>
   <p:notesSz cx="6858000" cy="9144000"/>
@@ -119,7 +121,7 @@
   <pc:docChgLst>
     <pc:chgData name="solomon ozoemenam" userId="e9c497bf7611b79e" providerId="LiveId" clId="{0B6F2A1B-FF64-4CEC-A27E-7B2413945E07}"/>
     <pc:docChg chg="undo custSel addSld modSld">
-      <pc:chgData name="solomon ozoemenam" userId="e9c497bf7611b79e" providerId="LiveId" clId="{0B6F2A1B-FF64-4CEC-A27E-7B2413945E07}" dt="2021-05-20T07:24:23.137" v="46" actId="14100"/>
+      <pc:chgData name="solomon ozoemenam" userId="e9c497bf7611b79e" providerId="LiveId" clId="{0B6F2A1B-FF64-4CEC-A27E-7B2413945E07}" dt="2021-06-03T14:12:17.525" v="291" actId="207"/>
       <pc:docMkLst>
         <pc:docMk/>
       </pc:docMkLst>
@@ -626,6 +628,172 @@
           </ac:picMkLst>
         </pc:picChg>
       </pc:sldChg>
+      <pc:sldChg chg="addSp delSp modSp new mod">
+        <pc:chgData name="solomon ozoemenam" userId="e9c497bf7611b79e" providerId="LiveId" clId="{0B6F2A1B-FF64-4CEC-A27E-7B2413945E07}" dt="2021-06-03T14:11:49.897" v="286" actId="21"/>
+        <pc:sldMkLst>
+          <pc:docMk/>
+          <pc:sldMk cId="2841829355" sldId="259"/>
+        </pc:sldMkLst>
+        <pc:spChg chg="add del mod">
+          <ac:chgData name="solomon ozoemenam" userId="e9c497bf7611b79e" providerId="LiveId" clId="{0B6F2A1B-FF64-4CEC-A27E-7B2413945E07}" dt="2021-06-03T14:11:49.897" v="286" actId="21"/>
+          <ac:spMkLst>
+            <pc:docMk/>
+            <pc:sldMk cId="2841829355" sldId="259"/>
+            <ac:spMk id="2" creationId="{F29EB762-FBCC-4EBA-BF62-49BF021CDC58}"/>
+          </ac:spMkLst>
+        </pc:spChg>
+        <pc:spChg chg="add del mod">
+          <ac:chgData name="solomon ozoemenam" userId="e9c497bf7611b79e" providerId="LiveId" clId="{0B6F2A1B-FF64-4CEC-A27E-7B2413945E07}" dt="2021-06-03T13:58:43.342" v="110" actId="478"/>
+          <ac:spMkLst>
+            <pc:docMk/>
+            <pc:sldMk cId="2841829355" sldId="259"/>
+            <ac:spMk id="5" creationId="{B3808D94-6CE9-4EE5-882D-0E9956E91CF6}"/>
+          </ac:spMkLst>
+        </pc:spChg>
+        <pc:spChg chg="add del mod ord">
+          <ac:chgData name="solomon ozoemenam" userId="e9c497bf7611b79e" providerId="LiveId" clId="{0B6F2A1B-FF64-4CEC-A27E-7B2413945E07}" dt="2021-06-03T14:00:52.809" v="125"/>
+          <ac:spMkLst>
+            <pc:docMk/>
+            <pc:sldMk cId="2841829355" sldId="259"/>
+            <ac:spMk id="6" creationId="{FF2EF706-96DF-46AE-8052-C84FCB6904E5}"/>
+          </ac:spMkLst>
+        </pc:spChg>
+        <pc:spChg chg="add del mod">
+          <ac:chgData name="solomon ozoemenam" userId="e9c497bf7611b79e" providerId="LiveId" clId="{0B6F2A1B-FF64-4CEC-A27E-7B2413945E07}" dt="2021-06-03T14:00:52.809" v="125"/>
+          <ac:spMkLst>
+            <pc:docMk/>
+            <pc:sldMk cId="2841829355" sldId="259"/>
+            <ac:spMk id="7" creationId="{FDAB64DD-C2F6-4B61-AEB9-F1DA3544D50B}"/>
+          </ac:spMkLst>
+        </pc:spChg>
+        <pc:spChg chg="add del">
+          <ac:chgData name="solomon ozoemenam" userId="e9c497bf7611b79e" providerId="LiveId" clId="{0B6F2A1B-FF64-4CEC-A27E-7B2413945E07}" dt="2021-06-03T14:00:01.559" v="121"/>
+          <ac:spMkLst>
+            <pc:docMk/>
+            <pc:sldMk cId="2841829355" sldId="259"/>
+            <ac:spMk id="8" creationId="{B9D3DE15-95DB-4C07-A5B9-DE228F26696A}"/>
+          </ac:spMkLst>
+        </pc:spChg>
+        <pc:spChg chg="del mod">
+          <ac:chgData name="solomon ozoemenam" userId="e9c497bf7611b79e" providerId="LiveId" clId="{0B6F2A1B-FF64-4CEC-A27E-7B2413945E07}" dt="2021-06-03T14:05:06.622" v="196" actId="478"/>
+          <ac:spMkLst>
+            <pc:docMk/>
+            <pc:sldMk cId="2841829355" sldId="259"/>
+            <ac:spMk id="9" creationId="{2DFCD41E-5D54-4D46-B883-5D057245A903}"/>
+          </ac:spMkLst>
+        </pc:spChg>
+        <pc:spChg chg="add del mod">
+          <ac:chgData name="solomon ozoemenam" userId="e9c497bf7611b79e" providerId="LiveId" clId="{0B6F2A1B-FF64-4CEC-A27E-7B2413945E07}" dt="2021-06-03T14:01:03.191" v="127"/>
+          <ac:spMkLst>
+            <pc:docMk/>
+            <pc:sldMk cId="2841829355" sldId="259"/>
+            <ac:spMk id="10" creationId="{84F18809-702C-44C5-BFD1-90596F269705}"/>
+          </ac:spMkLst>
+        </pc:spChg>
+        <pc:spChg chg="add del mod">
+          <ac:chgData name="solomon ozoemenam" userId="e9c497bf7611b79e" providerId="LiveId" clId="{0B6F2A1B-FF64-4CEC-A27E-7B2413945E07}" dt="2021-06-03T14:05:34.574" v="201" actId="478"/>
+          <ac:spMkLst>
+            <pc:docMk/>
+            <pc:sldMk cId="2841829355" sldId="259"/>
+            <ac:spMk id="12" creationId="{AE6163C3-E87B-4776-B143-E5A93C9B7087}"/>
+          </ac:spMkLst>
+        </pc:spChg>
+        <pc:spChg chg="add del mod ord">
+          <ac:chgData name="solomon ozoemenam" userId="e9c497bf7611b79e" providerId="LiveId" clId="{0B6F2A1B-FF64-4CEC-A27E-7B2413945E07}" dt="2021-06-03T14:11:25.245" v="282" actId="14100"/>
+          <ac:spMkLst>
+            <pc:docMk/>
+            <pc:sldMk cId="2841829355" sldId="259"/>
+            <ac:spMk id="13" creationId="{53EBBCD1-D484-4EE8-843E-ADA144BE5868}"/>
+          </ac:spMkLst>
+        </pc:spChg>
+        <pc:spChg chg="add del mod">
+          <ac:chgData name="solomon ozoemenam" userId="e9c497bf7611b79e" providerId="LiveId" clId="{0B6F2A1B-FF64-4CEC-A27E-7B2413945E07}" dt="2021-06-03T14:10:47.903" v="274"/>
+          <ac:spMkLst>
+            <pc:docMk/>
+            <pc:sldMk cId="2841829355" sldId="259"/>
+            <ac:spMk id="14" creationId="{847A0D4C-DB64-4C15-AA81-BBFDF47EC00E}"/>
+          </ac:spMkLst>
+        </pc:spChg>
+        <pc:spChg chg="mod">
+          <ac:chgData name="solomon ozoemenam" userId="e9c497bf7611b79e" providerId="LiveId" clId="{0B6F2A1B-FF64-4CEC-A27E-7B2413945E07}" dt="2021-06-03T14:08:48.231" v="241"/>
+          <ac:spMkLst>
+            <pc:docMk/>
+            <pc:sldMk cId="2841829355" sldId="259"/>
+            <ac:spMk id="15" creationId="{F736B854-330D-4A61-82CA-B87219128C1F}"/>
+          </ac:spMkLst>
+        </pc:spChg>
+        <pc:spChg chg="add del mod">
+          <ac:chgData name="solomon ozoemenam" userId="e9c497bf7611b79e" providerId="LiveId" clId="{0B6F2A1B-FF64-4CEC-A27E-7B2413945E07}" dt="2021-06-03T14:10:47.903" v="274"/>
+          <ac:spMkLst>
+            <pc:docMk/>
+            <pc:sldMk cId="2841829355" sldId="259"/>
+            <ac:spMk id="16" creationId="{D8BD51D6-8841-4C95-8FDC-01CA183B7AD9}"/>
+          </ac:spMkLst>
+        </pc:spChg>
+        <pc:spChg chg="mod">
+          <ac:chgData name="solomon ozoemenam" userId="e9c497bf7611b79e" providerId="LiveId" clId="{0B6F2A1B-FF64-4CEC-A27E-7B2413945E07}" dt="2021-06-03T14:10:47.903" v="274"/>
+          <ac:spMkLst>
+            <pc:docMk/>
+            <pc:sldMk cId="2841829355" sldId="259"/>
+            <ac:spMk id="17" creationId="{0140E7BE-817E-4597-8561-C12BA79F68C2}"/>
+          </ac:spMkLst>
+        </pc:spChg>
+        <pc:spChg chg="add del mod">
+          <ac:chgData name="solomon ozoemenam" userId="e9c497bf7611b79e" providerId="LiveId" clId="{0B6F2A1B-FF64-4CEC-A27E-7B2413945E07}" dt="2021-06-03T14:10:47.903" v="274"/>
+          <ac:spMkLst>
+            <pc:docMk/>
+            <pc:sldMk cId="2841829355" sldId="259"/>
+            <ac:spMk id="18" creationId="{CEA52BCE-5BEC-4F5E-9F4D-266BA3D65B18}"/>
+          </ac:spMkLst>
+        </pc:spChg>
+        <pc:picChg chg="add del mod modCrop">
+          <ac:chgData name="solomon ozoemenam" userId="e9c497bf7611b79e" providerId="LiveId" clId="{0B6F2A1B-FF64-4CEC-A27E-7B2413945E07}" dt="2021-06-03T14:11:04.727" v="278" actId="14100"/>
+          <ac:picMkLst>
+            <pc:docMk/>
+            <pc:sldMk cId="2841829355" sldId="259"/>
+            <ac:picMk id="4" creationId="{368826B1-F4CE-4089-A371-1CBE84C4C2B1}"/>
+          </ac:picMkLst>
+        </pc:picChg>
+        <pc:picChg chg="add del mod">
+          <ac:chgData name="solomon ozoemenam" userId="e9c497bf7611b79e" providerId="LiveId" clId="{0B6F2A1B-FF64-4CEC-A27E-7B2413945E07}" dt="2021-06-03T14:11:49.897" v="286" actId="21"/>
+          <ac:picMkLst>
+            <pc:docMk/>
+            <pc:sldMk cId="2841829355" sldId="259"/>
+            <ac:picMk id="11" creationId="{BDFE05E3-3651-4D8D-8600-B7869D20056C}"/>
+          </ac:picMkLst>
+        </pc:picChg>
+        <pc:picChg chg="add mod">
+          <ac:chgData name="solomon ozoemenam" userId="e9c497bf7611b79e" providerId="LiveId" clId="{0B6F2A1B-FF64-4CEC-A27E-7B2413945E07}" dt="2021-06-03T14:10:53.366" v="276" actId="1076"/>
+          <ac:picMkLst>
+            <pc:docMk/>
+            <pc:sldMk cId="2841829355" sldId="259"/>
+            <ac:picMk id="19" creationId="{E064ADEE-374E-4679-8F26-4E2C7EAB0671}"/>
+          </ac:picMkLst>
+        </pc:picChg>
+      </pc:sldChg>
+      <pc:sldChg chg="addSp modSp new mod">
+        <pc:chgData name="solomon ozoemenam" userId="e9c497bf7611b79e" providerId="LiveId" clId="{0B6F2A1B-FF64-4CEC-A27E-7B2413945E07}" dt="2021-06-03T14:12:17.525" v="291" actId="207"/>
+        <pc:sldMkLst>
+          <pc:docMk/>
+          <pc:sldMk cId="1227152036" sldId="260"/>
+        </pc:sldMkLst>
+        <pc:spChg chg="add mod">
+          <ac:chgData name="solomon ozoemenam" userId="e9c497bf7611b79e" providerId="LiveId" clId="{0B6F2A1B-FF64-4CEC-A27E-7B2413945E07}" dt="2021-06-03T14:12:17.525" v="291" actId="207"/>
+          <ac:spMkLst>
+            <pc:docMk/>
+            <pc:sldMk cId="1227152036" sldId="260"/>
+            <ac:spMk id="2" creationId="{1EB5BA1C-A92C-4054-80B3-B226BBBDB892}"/>
+          </ac:spMkLst>
+        </pc:spChg>
+        <pc:picChg chg="add mod">
+          <ac:chgData name="solomon ozoemenam" userId="e9c497bf7611b79e" providerId="LiveId" clId="{0B6F2A1B-FF64-4CEC-A27E-7B2413945E07}" dt="2021-06-03T14:12:11.693" v="290" actId="1076"/>
+          <ac:picMkLst>
+            <pc:docMk/>
+            <pc:sldMk cId="1227152036" sldId="260"/>
+            <ac:picMk id="3" creationId="{86A05241-C973-4943-982A-54536D70BC15}"/>
+          </ac:picMkLst>
+        </pc:picChg>
+      </pc:sldChg>
     </pc:docChg>
   </pc:docChgLst>
   <pc:docChgLst>
@@ -820,7 +988,7 @@
           <a:p>
             <a:fld id="{25994242-4E4C-486C-97EB-EDB807D924C5}" type="datetimeFigureOut">
               <a:rPr lang="en-GB" smtClean="0"/>
-              <a:t>20/05/2021</a:t>
+              <a:t>03/06/2021</a:t>
             </a:fld>
             <a:endParaRPr lang="en-GB"/>
           </a:p>
@@ -1020,7 +1188,7 @@
           <a:p>
             <a:fld id="{25994242-4E4C-486C-97EB-EDB807D924C5}" type="datetimeFigureOut">
               <a:rPr lang="en-GB" smtClean="0"/>
-              <a:t>20/05/2021</a:t>
+              <a:t>03/06/2021</a:t>
             </a:fld>
             <a:endParaRPr lang="en-GB"/>
           </a:p>
@@ -1230,7 +1398,7 @@
           <a:p>
             <a:fld id="{25994242-4E4C-486C-97EB-EDB807D924C5}" type="datetimeFigureOut">
               <a:rPr lang="en-GB" smtClean="0"/>
-              <a:t>20/05/2021</a:t>
+              <a:t>03/06/2021</a:t>
             </a:fld>
             <a:endParaRPr lang="en-GB"/>
           </a:p>
@@ -1430,7 +1598,7 @@
           <a:p>
             <a:fld id="{25994242-4E4C-486C-97EB-EDB807D924C5}" type="datetimeFigureOut">
               <a:rPr lang="en-GB" smtClean="0"/>
-              <a:t>20/05/2021</a:t>
+              <a:t>03/06/2021</a:t>
             </a:fld>
             <a:endParaRPr lang="en-GB"/>
           </a:p>
@@ -1706,7 +1874,7 @@
           <a:p>
             <a:fld id="{25994242-4E4C-486C-97EB-EDB807D924C5}" type="datetimeFigureOut">
               <a:rPr lang="en-GB" smtClean="0"/>
-              <a:t>20/05/2021</a:t>
+              <a:t>03/06/2021</a:t>
             </a:fld>
             <a:endParaRPr lang="en-GB"/>
           </a:p>
@@ -1974,7 +2142,7 @@
           <a:p>
             <a:fld id="{25994242-4E4C-486C-97EB-EDB807D924C5}" type="datetimeFigureOut">
               <a:rPr lang="en-GB" smtClean="0"/>
-              <a:t>20/05/2021</a:t>
+              <a:t>03/06/2021</a:t>
             </a:fld>
             <a:endParaRPr lang="en-GB"/>
           </a:p>
@@ -2389,7 +2557,7 @@
           <a:p>
             <a:fld id="{25994242-4E4C-486C-97EB-EDB807D924C5}" type="datetimeFigureOut">
               <a:rPr lang="en-GB" smtClean="0"/>
-              <a:t>20/05/2021</a:t>
+              <a:t>03/06/2021</a:t>
             </a:fld>
             <a:endParaRPr lang="en-GB"/>
           </a:p>
@@ -2531,7 +2699,7 @@
           <a:p>
             <a:fld id="{25994242-4E4C-486C-97EB-EDB807D924C5}" type="datetimeFigureOut">
               <a:rPr lang="en-GB" smtClean="0"/>
-              <a:t>20/05/2021</a:t>
+              <a:t>03/06/2021</a:t>
             </a:fld>
             <a:endParaRPr lang="en-GB"/>
           </a:p>
@@ -2644,7 +2812,7 @@
           <a:p>
             <a:fld id="{25994242-4E4C-486C-97EB-EDB807D924C5}" type="datetimeFigureOut">
               <a:rPr lang="en-GB" smtClean="0"/>
-              <a:t>20/05/2021</a:t>
+              <a:t>03/06/2021</a:t>
             </a:fld>
             <a:endParaRPr lang="en-GB"/>
           </a:p>
@@ -2957,7 +3125,7 @@
           <a:p>
             <a:fld id="{25994242-4E4C-486C-97EB-EDB807D924C5}" type="datetimeFigureOut">
               <a:rPr lang="en-GB" smtClean="0"/>
-              <a:t>20/05/2021</a:t>
+              <a:t>03/06/2021</a:t>
             </a:fld>
             <a:endParaRPr lang="en-GB"/>
           </a:p>
@@ -3246,7 +3414,7 @@
           <a:p>
             <a:fld id="{25994242-4E4C-486C-97EB-EDB807D924C5}" type="datetimeFigureOut">
               <a:rPr lang="en-GB" smtClean="0"/>
-              <a:t>20/05/2021</a:t>
+              <a:t>03/06/2021</a:t>
             </a:fld>
             <a:endParaRPr lang="en-GB"/>
           </a:p>
@@ -3489,7 +3657,7 @@
           <a:p>
             <a:fld id="{25994242-4E4C-486C-97EB-EDB807D924C5}" type="datetimeFigureOut">
               <a:rPr lang="en-GB" smtClean="0"/>
-              <a:t>20/05/2021</a:t>
+              <a:t>03/06/2021</a:t>
             </a:fld>
             <a:endParaRPr lang="en-GB"/>
           </a:p>
@@ -22406,6 +22574,331 @@
 </p:sld>
 </file>
 
+<file path=ppt/slides/slide4.xml><?xml version="1.0" encoding="utf-8"?>
+<p:sld xmlns:a="http://schemas.openxmlformats.org/drawingml/2006/main" xmlns:r="http://schemas.openxmlformats.org/officeDocument/2006/relationships" xmlns:p="http://schemas.openxmlformats.org/presentationml/2006/main">
+  <p:cSld>
+    <p:spTree>
+      <p:nvGrpSpPr>
+        <p:cNvPr id="1" name=""/>
+        <p:cNvGrpSpPr/>
+        <p:nvPr/>
+      </p:nvGrpSpPr>
+      <p:grpSpPr>
+        <a:xfrm>
+          <a:off x="0" y="0"/>
+          <a:ext cx="0" cy="0"/>
+          <a:chOff x="0" y="0"/>
+          <a:chExt cx="0" cy="0"/>
+        </a:xfrm>
+      </p:grpSpPr>
+      <p:sp>
+        <p:nvSpPr>
+          <p:cNvPr id="13" name="Oval 12">
+            <a:extLst>
+              <a:ext uri="{FF2B5EF4-FFF2-40B4-BE49-F238E27FC236}">
+                <a16:creationId xmlns:a16="http://schemas.microsoft.com/office/drawing/2014/main" id="{53EBBCD1-D484-4EE8-843E-ADA144BE5868}"/>
+              </a:ext>
+            </a:extLst>
+          </p:cNvPr>
+          <p:cNvSpPr/>
+          <p:nvPr/>
+        </p:nvSpPr>
+        <p:spPr>
+          <a:xfrm>
+            <a:off x="2719345" y="906780"/>
+            <a:ext cx="3697481" cy="5524500"/>
+          </a:xfrm>
+          <a:prstGeom prst="ellipse">
+            <a:avLst/>
+          </a:prstGeom>
+          <a:solidFill>
+            <a:schemeClr val="bg1"/>
+          </a:solidFill>
+        </p:spPr>
+        <p:style>
+          <a:lnRef idx="2">
+            <a:schemeClr val="accent1">
+              <a:shade val="50000"/>
+            </a:schemeClr>
+          </a:lnRef>
+          <a:fillRef idx="1">
+            <a:schemeClr val="accent1"/>
+          </a:fillRef>
+          <a:effectRef idx="0">
+            <a:schemeClr val="accent1"/>
+          </a:effectRef>
+          <a:fontRef idx="minor">
+            <a:schemeClr val="lt1"/>
+          </a:fontRef>
+        </p:style>
+        <p:txBody>
+          <a:bodyPr rtlCol="0" anchor="ctr"/>
+          <a:lstStyle/>
+          <a:p>
+            <a:pPr algn="ctr"/>
+            <a:endParaRPr lang="en-GB"/>
+          </a:p>
+        </p:txBody>
+      </p:sp>
+      <p:pic>
+        <p:nvPicPr>
+          <p:cNvPr id="4" name="Picture 3">
+            <a:extLst>
+              <a:ext uri="{FF2B5EF4-FFF2-40B4-BE49-F238E27FC236}">
+                <a16:creationId xmlns:a16="http://schemas.microsoft.com/office/drawing/2014/main" id="{368826B1-F4CE-4089-A371-1CBE84C4C2B1}"/>
+              </a:ext>
+            </a:extLst>
+          </p:cNvPr>
+          <p:cNvPicPr>
+            <a:picLocks noChangeAspect="1"/>
+          </p:cNvPicPr>
+          <p:nvPr/>
+        </p:nvPicPr>
+        <p:blipFill rotWithShape="1">
+          <a:blip r:embed="rId2">
+            <a:extLst>
+              <a:ext uri="{28A0092B-C50C-407E-A947-70E740481C1C}">
+                <a14:useLocalDpi xmlns:a14="http://schemas.microsoft.com/office/drawing/2010/main" val="0"/>
+              </a:ext>
+            </a:extLst>
+          </a:blip>
+          <a:srcRect l="17311" r="66873" b="23495"/>
+          <a:stretch/>
+        </p:blipFill>
+        <p:spPr>
+          <a:xfrm>
+            <a:off x="2719346" y="1355999"/>
+            <a:ext cx="3055829" cy="4503685"/>
+          </a:xfrm>
+          <a:prstGeom prst="rect">
+            <a:avLst/>
+          </a:prstGeom>
+          <a:ln>
+            <a:noFill/>
+          </a:ln>
+          <a:effectLst>
+            <a:outerShdw blurRad="50800" dist="38100" dir="8100000" algn="tr" rotWithShape="0">
+              <a:prstClr val="black">
+                <a:alpha val="40000"/>
+              </a:prstClr>
+            </a:outerShdw>
+          </a:effectLst>
+        </p:spPr>
+      </p:pic>
+      <p:sp>
+        <p:nvSpPr>
+          <p:cNvPr id="14" name="Oval 13">
+            <a:extLst>
+              <a:ext uri="{FF2B5EF4-FFF2-40B4-BE49-F238E27FC236}">
+                <a16:creationId xmlns:a16="http://schemas.microsoft.com/office/drawing/2014/main" id="{847A0D4C-DB64-4C15-AA81-BBFDF47EC00E}"/>
+              </a:ext>
+            </a:extLst>
+          </p:cNvPr>
+          <p:cNvSpPr/>
+          <p:nvPr/>
+        </p:nvSpPr>
+        <p:spPr>
+          <a:xfrm rot="401678">
+            <a:off x="2026514" y="2968226"/>
+            <a:ext cx="1494331" cy="2011207"/>
+          </a:xfrm>
+          <a:prstGeom prst="ellipse">
+            <a:avLst/>
+          </a:prstGeom>
+          <a:solidFill>
+            <a:schemeClr val="bg1"/>
+          </a:solidFill>
+        </p:spPr>
+        <p:style>
+          <a:lnRef idx="2">
+            <a:schemeClr val="accent1">
+              <a:shade val="50000"/>
+            </a:schemeClr>
+          </a:lnRef>
+          <a:fillRef idx="1">
+            <a:schemeClr val="accent1"/>
+          </a:fillRef>
+          <a:effectRef idx="0">
+            <a:schemeClr val="accent1"/>
+          </a:effectRef>
+          <a:fontRef idx="minor">
+            <a:schemeClr val="lt1"/>
+          </a:fontRef>
+        </p:style>
+        <p:txBody>
+          <a:bodyPr rtlCol="0" anchor="ctr"/>
+          <a:lstStyle/>
+          <a:p>
+            <a:pPr algn="ctr"/>
+            <a:endParaRPr lang="en-GB"/>
+          </a:p>
+        </p:txBody>
+      </p:sp>
+      <p:pic>
+        <p:nvPicPr>
+          <p:cNvPr id="19" name="Picture 18">
+            <a:extLst>
+              <a:ext uri="{FF2B5EF4-FFF2-40B4-BE49-F238E27FC236}">
+                <a16:creationId xmlns:a16="http://schemas.microsoft.com/office/drawing/2014/main" id="{E064ADEE-374E-4679-8F26-4E2C7EAB0671}"/>
+              </a:ext>
+            </a:extLst>
+          </p:cNvPr>
+          <p:cNvPicPr>
+            <a:picLocks noChangeAspect="1"/>
+          </p:cNvPicPr>
+          <p:nvPr/>
+        </p:nvPicPr>
+        <p:blipFill rotWithShape="1">
+          <a:blip r:embed="rId2">
+            <a:extLst>
+              <a:ext uri="{28A0092B-C50C-407E-A947-70E740481C1C}">
+                <a14:useLocalDpi xmlns:a14="http://schemas.microsoft.com/office/drawing/2010/main" val="0"/>
+              </a:ext>
+            </a:extLst>
+          </a:blip>
+          <a:srcRect l="17311" r="66873" b="23495"/>
+          <a:stretch/>
+        </p:blipFill>
+        <p:spPr>
+          <a:xfrm>
+            <a:off x="7944739" y="2994299"/>
+            <a:ext cx="3055829" cy="4503685"/>
+          </a:xfrm>
+          <a:prstGeom prst="rect">
+            <a:avLst/>
+          </a:prstGeom>
+          <a:ln>
+            <a:noFill/>
+          </a:ln>
+          <a:effectLst>
+            <a:outerShdw blurRad="50800" dist="38100" dir="8100000" algn="tr" rotWithShape="0">
+              <a:prstClr val="black">
+                <a:alpha val="40000"/>
+              </a:prstClr>
+            </a:outerShdw>
+          </a:effectLst>
+        </p:spPr>
+      </p:pic>
+    </p:spTree>
+    <p:extLst>
+      <p:ext uri="{BB962C8B-B14F-4D97-AF65-F5344CB8AC3E}">
+        <p14:creationId xmlns:p14="http://schemas.microsoft.com/office/powerpoint/2010/main" val="2841829355"/>
+      </p:ext>
+    </p:extLst>
+  </p:cSld>
+  <p:clrMapOvr>
+    <a:masterClrMapping/>
+  </p:clrMapOvr>
+</p:sld>
+</file>
+
+<file path=ppt/slides/slide5.xml><?xml version="1.0" encoding="utf-8"?>
+<p:sld xmlns:a="http://schemas.openxmlformats.org/drawingml/2006/main" xmlns:r="http://schemas.openxmlformats.org/officeDocument/2006/relationships" xmlns:p="http://schemas.openxmlformats.org/presentationml/2006/main">
+  <p:cSld>
+    <p:spTree>
+      <p:nvGrpSpPr>
+        <p:cNvPr id="1" name=""/>
+        <p:cNvGrpSpPr/>
+        <p:nvPr/>
+      </p:nvGrpSpPr>
+      <p:grpSpPr>
+        <a:xfrm>
+          <a:off x="0" y="0"/>
+          <a:ext cx="0" cy="0"/>
+          <a:chOff x="0" y="0"/>
+          <a:chExt cx="0" cy="0"/>
+        </a:xfrm>
+      </p:grpSpPr>
+      <p:sp>
+        <p:nvSpPr>
+          <p:cNvPr id="2" name="Oval 1">
+            <a:extLst>
+              <a:ext uri="{FF2B5EF4-FFF2-40B4-BE49-F238E27FC236}">
+                <a16:creationId xmlns:a16="http://schemas.microsoft.com/office/drawing/2014/main" id="{1EB5BA1C-A92C-4054-80B3-B226BBBDB892}"/>
+              </a:ext>
+            </a:extLst>
+          </p:cNvPr>
+          <p:cNvSpPr/>
+          <p:nvPr/>
+        </p:nvSpPr>
+        <p:spPr>
+          <a:xfrm>
+            <a:off x="2945800" y="804278"/>
+            <a:ext cx="4878000" cy="4878000"/>
+          </a:xfrm>
+          <a:prstGeom prst="ellipse">
+            <a:avLst/>
+          </a:prstGeom>
+          <a:noFill/>
+        </p:spPr>
+        <p:style>
+          <a:lnRef idx="2">
+            <a:schemeClr val="accent1">
+              <a:shade val="50000"/>
+            </a:schemeClr>
+          </a:lnRef>
+          <a:fillRef idx="1">
+            <a:schemeClr val="accent1"/>
+          </a:fillRef>
+          <a:effectRef idx="0">
+            <a:schemeClr val="accent1"/>
+          </a:effectRef>
+          <a:fontRef idx="minor">
+            <a:schemeClr val="lt1"/>
+          </a:fontRef>
+        </p:style>
+        <p:txBody>
+          <a:bodyPr rtlCol="0" anchor="ctr"/>
+          <a:lstStyle/>
+          <a:p>
+            <a:pPr algn="ctr"/>
+            <a:endParaRPr lang="en-GB"/>
+          </a:p>
+        </p:txBody>
+      </p:sp>
+      <p:pic>
+        <p:nvPicPr>
+          <p:cNvPr id="3" name="Picture 2">
+            <a:extLst>
+              <a:ext uri="{FF2B5EF4-FFF2-40B4-BE49-F238E27FC236}">
+                <a16:creationId xmlns:a16="http://schemas.microsoft.com/office/drawing/2014/main" id="{86A05241-C973-4943-982A-54536D70BC15}"/>
+              </a:ext>
+            </a:extLst>
+          </p:cNvPr>
+          <p:cNvPicPr>
+            <a:picLocks noChangeAspect="1"/>
+          </p:cNvPicPr>
+          <p:nvPr/>
+        </p:nvPicPr>
+        <p:blipFill>
+          <a:blip r:embed="rId2"/>
+          <a:stretch>
+            <a:fillRect/>
+          </a:stretch>
+        </p:blipFill>
+        <p:spPr>
+          <a:xfrm>
+            <a:off x="3574131" y="801619"/>
+            <a:ext cx="3621338" cy="4883319"/>
+          </a:xfrm>
+          <a:prstGeom prst="rect">
+            <a:avLst/>
+          </a:prstGeom>
+        </p:spPr>
+      </p:pic>
+    </p:spTree>
+    <p:extLst>
+      <p:ext uri="{BB962C8B-B14F-4D97-AF65-F5344CB8AC3E}">
+        <p14:creationId xmlns:p14="http://schemas.microsoft.com/office/powerpoint/2010/main" val="1227152036"/>
+      </p:ext>
+    </p:extLst>
+  </p:cSld>
+  <p:clrMapOvr>
+    <a:masterClrMapping/>
+  </p:clrMapOvr>
+</p:sld>
+</file>
+
 <file path=ppt/theme/theme1.xml><?xml version="1.0" encoding="utf-8"?>
 <a:theme xmlns:a="http://schemas.openxmlformats.org/drawingml/2006/main" name="Office Theme">
   <a:themeElements>

</xml_diff>

<commit_message>
update filesytem plugin wegen error, card image alt, responsive footer, align nav
</commit_message>
<xml_diff>
--- a/UI/Blog_UI.pptx
+++ b/UI/Blog_UI.pptx
@@ -10,6 +10,7 @@
     <p:sldId id="258" r:id="rId4"/>
     <p:sldId id="259" r:id="rId5"/>
     <p:sldId id="260" r:id="rId6"/>
+    <p:sldId id="261" r:id="rId7"/>
   </p:sldIdLst>
   <p:sldSz cx="12192000" cy="6858000"/>
   <p:notesSz cx="6858000" cy="9144000"/>
@@ -120,8 +121,8 @@
 <pc:chgInfo xmlns:a="http://schemas.openxmlformats.org/drawingml/2006/main" xmlns:r="http://schemas.openxmlformats.org/officeDocument/2006/relationships" xmlns:ac="http://schemas.microsoft.com/office/drawing/2013/main/command" xmlns:pc="http://schemas.microsoft.com/office/powerpoint/2013/main/command">
   <pc:docChgLst>
     <pc:chgData name="solomon ozoemenam" userId="e9c497bf7611b79e" providerId="LiveId" clId="{0B6F2A1B-FF64-4CEC-A27E-7B2413945E07}"/>
-    <pc:docChg chg="undo custSel addSld modSld">
-      <pc:chgData name="solomon ozoemenam" userId="e9c497bf7611b79e" providerId="LiveId" clId="{0B6F2A1B-FF64-4CEC-A27E-7B2413945E07}" dt="2021-06-03T14:12:17.525" v="291" actId="207"/>
+    <pc:docChg chg="undo custSel addSld modSld sldOrd">
+      <pc:chgData name="solomon ozoemenam" userId="e9c497bf7611b79e" providerId="LiveId" clId="{0B6F2A1B-FF64-4CEC-A27E-7B2413945E07}" dt="2021-06-04T08:29:17.526" v="300"/>
       <pc:docMkLst>
         <pc:docMk/>
       </pc:docMkLst>
@@ -794,6 +795,21 @@
           </ac:picMkLst>
         </pc:picChg>
       </pc:sldChg>
+      <pc:sldChg chg="addSp modSp new mod ord">
+        <pc:chgData name="solomon ozoemenam" userId="e9c497bf7611b79e" providerId="LiveId" clId="{0B6F2A1B-FF64-4CEC-A27E-7B2413945E07}" dt="2021-06-04T08:29:17.526" v="300"/>
+        <pc:sldMkLst>
+          <pc:docMk/>
+          <pc:sldMk cId="1444152714" sldId="261"/>
+        </pc:sldMkLst>
+        <pc:picChg chg="add mod modCrop">
+          <ac:chgData name="solomon ozoemenam" userId="e9c497bf7611b79e" providerId="LiveId" clId="{0B6F2A1B-FF64-4CEC-A27E-7B2413945E07}" dt="2021-06-04T08:29:10.432" v="298" actId="1076"/>
+          <ac:picMkLst>
+            <pc:docMk/>
+            <pc:sldMk cId="1444152714" sldId="261"/>
+            <ac:picMk id="3" creationId="{D4E0421E-7A6D-4E22-BC29-A67FF96DC893}"/>
+          </ac:picMkLst>
+        </pc:picChg>
+      </pc:sldChg>
     </pc:docChg>
   </pc:docChgLst>
   <pc:docChgLst>
@@ -988,7 +1004,7 @@
           <a:p>
             <a:fld id="{25994242-4E4C-486C-97EB-EDB807D924C5}" type="datetimeFigureOut">
               <a:rPr lang="en-GB" smtClean="0"/>
-              <a:t>03/06/2021</a:t>
+              <a:t>04/06/2021</a:t>
             </a:fld>
             <a:endParaRPr lang="en-GB"/>
           </a:p>
@@ -1188,7 +1204,7 @@
           <a:p>
             <a:fld id="{25994242-4E4C-486C-97EB-EDB807D924C5}" type="datetimeFigureOut">
               <a:rPr lang="en-GB" smtClean="0"/>
-              <a:t>03/06/2021</a:t>
+              <a:t>04/06/2021</a:t>
             </a:fld>
             <a:endParaRPr lang="en-GB"/>
           </a:p>
@@ -1398,7 +1414,7 @@
           <a:p>
             <a:fld id="{25994242-4E4C-486C-97EB-EDB807D924C5}" type="datetimeFigureOut">
               <a:rPr lang="en-GB" smtClean="0"/>
-              <a:t>03/06/2021</a:t>
+              <a:t>04/06/2021</a:t>
             </a:fld>
             <a:endParaRPr lang="en-GB"/>
           </a:p>
@@ -1598,7 +1614,7 @@
           <a:p>
             <a:fld id="{25994242-4E4C-486C-97EB-EDB807D924C5}" type="datetimeFigureOut">
               <a:rPr lang="en-GB" smtClean="0"/>
-              <a:t>03/06/2021</a:t>
+              <a:t>04/06/2021</a:t>
             </a:fld>
             <a:endParaRPr lang="en-GB"/>
           </a:p>
@@ -1874,7 +1890,7 @@
           <a:p>
             <a:fld id="{25994242-4E4C-486C-97EB-EDB807D924C5}" type="datetimeFigureOut">
               <a:rPr lang="en-GB" smtClean="0"/>
-              <a:t>03/06/2021</a:t>
+              <a:t>04/06/2021</a:t>
             </a:fld>
             <a:endParaRPr lang="en-GB"/>
           </a:p>
@@ -2142,7 +2158,7 @@
           <a:p>
             <a:fld id="{25994242-4E4C-486C-97EB-EDB807D924C5}" type="datetimeFigureOut">
               <a:rPr lang="en-GB" smtClean="0"/>
-              <a:t>03/06/2021</a:t>
+              <a:t>04/06/2021</a:t>
             </a:fld>
             <a:endParaRPr lang="en-GB"/>
           </a:p>
@@ -2557,7 +2573,7 @@
           <a:p>
             <a:fld id="{25994242-4E4C-486C-97EB-EDB807D924C5}" type="datetimeFigureOut">
               <a:rPr lang="en-GB" smtClean="0"/>
-              <a:t>03/06/2021</a:t>
+              <a:t>04/06/2021</a:t>
             </a:fld>
             <a:endParaRPr lang="en-GB"/>
           </a:p>
@@ -2699,7 +2715,7 @@
           <a:p>
             <a:fld id="{25994242-4E4C-486C-97EB-EDB807D924C5}" type="datetimeFigureOut">
               <a:rPr lang="en-GB" smtClean="0"/>
-              <a:t>03/06/2021</a:t>
+              <a:t>04/06/2021</a:t>
             </a:fld>
             <a:endParaRPr lang="en-GB"/>
           </a:p>
@@ -2812,7 +2828,7 @@
           <a:p>
             <a:fld id="{25994242-4E4C-486C-97EB-EDB807D924C5}" type="datetimeFigureOut">
               <a:rPr lang="en-GB" smtClean="0"/>
-              <a:t>03/06/2021</a:t>
+              <a:t>04/06/2021</a:t>
             </a:fld>
             <a:endParaRPr lang="en-GB"/>
           </a:p>
@@ -3125,7 +3141,7 @@
           <a:p>
             <a:fld id="{25994242-4E4C-486C-97EB-EDB807D924C5}" type="datetimeFigureOut">
               <a:rPr lang="en-GB" smtClean="0"/>
-              <a:t>03/06/2021</a:t>
+              <a:t>04/06/2021</a:t>
             </a:fld>
             <a:endParaRPr lang="en-GB"/>
           </a:p>
@@ -3414,7 +3430,7 @@
           <a:p>
             <a:fld id="{25994242-4E4C-486C-97EB-EDB807D924C5}" type="datetimeFigureOut">
               <a:rPr lang="en-GB" smtClean="0"/>
-              <a:t>03/06/2021</a:t>
+              <a:t>04/06/2021</a:t>
             </a:fld>
             <a:endParaRPr lang="en-GB"/>
           </a:p>
@@ -3657,7 +3673,7 @@
           <a:p>
             <a:fld id="{25994242-4E4C-486C-97EB-EDB807D924C5}" type="datetimeFigureOut">
               <a:rPr lang="en-GB" smtClean="0"/>
-              <a:t>03/06/2021</a:t>
+              <a:t>04/06/2021</a:t>
             </a:fld>
             <a:endParaRPr lang="en-GB"/>
           </a:p>
@@ -22899,6 +22915,65 @@
 </p:sld>
 </file>
 
+<file path=ppt/slides/slide6.xml><?xml version="1.0" encoding="utf-8"?>
+<p:sld xmlns:a="http://schemas.openxmlformats.org/drawingml/2006/main" xmlns:r="http://schemas.openxmlformats.org/officeDocument/2006/relationships" xmlns:p="http://schemas.openxmlformats.org/presentationml/2006/main">
+  <p:cSld>
+    <p:spTree>
+      <p:nvGrpSpPr>
+        <p:cNvPr id="1" name=""/>
+        <p:cNvGrpSpPr/>
+        <p:nvPr/>
+      </p:nvGrpSpPr>
+      <p:grpSpPr>
+        <a:xfrm>
+          <a:off x="0" y="0"/>
+          <a:ext cx="0" cy="0"/>
+          <a:chOff x="0" y="0"/>
+          <a:chExt cx="0" cy="0"/>
+        </a:xfrm>
+      </p:grpSpPr>
+      <p:pic>
+        <p:nvPicPr>
+          <p:cNvPr id="3" name="Picture 2">
+            <a:extLst>
+              <a:ext uri="{FF2B5EF4-FFF2-40B4-BE49-F238E27FC236}">
+                <a16:creationId xmlns:a16="http://schemas.microsoft.com/office/drawing/2014/main" id="{D4E0421E-7A6D-4E22-BC29-A67FF96DC893}"/>
+              </a:ext>
+            </a:extLst>
+          </p:cNvPr>
+          <p:cNvPicPr>
+            <a:picLocks noChangeAspect="1"/>
+          </p:cNvPicPr>
+          <p:nvPr/>
+        </p:nvPicPr>
+        <p:blipFill rotWithShape="1">
+          <a:blip r:embed="rId2"/>
+          <a:srcRect l="28761" t="15188" r="35761" b="20232"/>
+          <a:stretch/>
+        </p:blipFill>
+        <p:spPr>
+          <a:xfrm>
+            <a:off x="644055" y="850789"/>
+            <a:ext cx="4325511" cy="4428877"/>
+          </a:xfrm>
+          <a:prstGeom prst="rect">
+            <a:avLst/>
+          </a:prstGeom>
+        </p:spPr>
+      </p:pic>
+    </p:spTree>
+    <p:extLst>
+      <p:ext uri="{BB962C8B-B14F-4D97-AF65-F5344CB8AC3E}">
+        <p14:creationId xmlns:p14="http://schemas.microsoft.com/office/powerpoint/2010/main" val="1444152714"/>
+      </p:ext>
+    </p:extLst>
+  </p:cSld>
+  <p:clrMapOvr>
+    <a:masterClrMapping/>
+  </p:clrMapOvr>
+</p:sld>
+</file>
+
 <file path=ppt/theme/theme1.xml><?xml version="1.0" encoding="utf-8"?>
 <a:theme xmlns:a="http://schemas.openxmlformats.org/drawingml/2006/main" name="Office Theme">
   <a:themeElements>

</xml_diff>